<commit_message>
AVL Tree-rotate when add
</commit_message>
<xml_diff>
--- a/9_BinaryTree/8_AVL/AVL树旋转思路分析.pptx
+++ b/9_BinaryTree/8_AVL/AVL树旋转思路分析.pptx
@@ -104,6 +104,11 @@
       </a:defRPr>
     </a:lvl9pPr>
   </p:defaultTextStyle>
+  <p:extLst>
+    <p:ext uri="{EFAFB233-063F-42B5-8137-9DF3F51BA10A}">
+      <p15:sldGuideLst xmlns:p15="http://schemas.microsoft.com/office/powerpoint/2012/main"/>
+    </p:ext>
+  </p:extLst>
 </p:presentation>
 </file>
 
@@ -256,7 +261,7 @@
           <a:p>
             <a:fld id="{271A724E-1DD8-4A67-BB12-444B089A282C}" type="datetimeFigureOut">
               <a:rPr lang="en-GB" smtClean="0"/>
-              <a:t>26/12/2023</a:t>
+              <a:t>10/01/2024</a:t>
             </a:fld>
             <a:endParaRPr lang="en-GB"/>
           </a:p>
@@ -456,7 +461,7 @@
           <a:p>
             <a:fld id="{271A724E-1DD8-4A67-BB12-444B089A282C}" type="datetimeFigureOut">
               <a:rPr lang="en-GB" smtClean="0"/>
-              <a:t>26/12/2023</a:t>
+              <a:t>10/01/2024</a:t>
             </a:fld>
             <a:endParaRPr lang="en-GB"/>
           </a:p>
@@ -666,7 +671,7 @@
           <a:p>
             <a:fld id="{271A724E-1DD8-4A67-BB12-444B089A282C}" type="datetimeFigureOut">
               <a:rPr lang="en-GB" smtClean="0"/>
-              <a:t>26/12/2023</a:t>
+              <a:t>10/01/2024</a:t>
             </a:fld>
             <a:endParaRPr lang="en-GB"/>
           </a:p>
@@ -866,7 +871,7 @@
           <a:p>
             <a:fld id="{271A724E-1DD8-4A67-BB12-444B089A282C}" type="datetimeFigureOut">
               <a:rPr lang="en-GB" smtClean="0"/>
-              <a:t>26/12/2023</a:t>
+              <a:t>10/01/2024</a:t>
             </a:fld>
             <a:endParaRPr lang="en-GB"/>
           </a:p>
@@ -1142,7 +1147,7 @@
           <a:p>
             <a:fld id="{271A724E-1DD8-4A67-BB12-444B089A282C}" type="datetimeFigureOut">
               <a:rPr lang="en-GB" smtClean="0"/>
-              <a:t>26/12/2023</a:t>
+              <a:t>10/01/2024</a:t>
             </a:fld>
             <a:endParaRPr lang="en-GB"/>
           </a:p>
@@ -1410,7 +1415,7 @@
           <a:p>
             <a:fld id="{271A724E-1DD8-4A67-BB12-444B089A282C}" type="datetimeFigureOut">
               <a:rPr lang="en-GB" smtClean="0"/>
-              <a:t>26/12/2023</a:t>
+              <a:t>10/01/2024</a:t>
             </a:fld>
             <a:endParaRPr lang="en-GB"/>
           </a:p>
@@ -1825,7 +1830,7 @@
           <a:p>
             <a:fld id="{271A724E-1DD8-4A67-BB12-444B089A282C}" type="datetimeFigureOut">
               <a:rPr lang="en-GB" smtClean="0"/>
-              <a:t>26/12/2023</a:t>
+              <a:t>10/01/2024</a:t>
             </a:fld>
             <a:endParaRPr lang="en-GB"/>
           </a:p>
@@ -1967,7 +1972,7 @@
           <a:p>
             <a:fld id="{271A724E-1DD8-4A67-BB12-444B089A282C}" type="datetimeFigureOut">
               <a:rPr lang="en-GB" smtClean="0"/>
-              <a:t>26/12/2023</a:t>
+              <a:t>10/01/2024</a:t>
             </a:fld>
             <a:endParaRPr lang="en-GB"/>
           </a:p>
@@ -2080,7 +2085,7 @@
           <a:p>
             <a:fld id="{271A724E-1DD8-4A67-BB12-444B089A282C}" type="datetimeFigureOut">
               <a:rPr lang="en-GB" smtClean="0"/>
-              <a:t>26/12/2023</a:t>
+              <a:t>10/01/2024</a:t>
             </a:fld>
             <a:endParaRPr lang="en-GB"/>
           </a:p>
@@ -2393,7 +2398,7 @@
           <a:p>
             <a:fld id="{271A724E-1DD8-4A67-BB12-444B089A282C}" type="datetimeFigureOut">
               <a:rPr lang="en-GB" smtClean="0"/>
-              <a:t>26/12/2023</a:t>
+              <a:t>10/01/2024</a:t>
             </a:fld>
             <a:endParaRPr lang="en-GB"/>
           </a:p>
@@ -2682,7 +2687,7 @@
           <a:p>
             <a:fld id="{271A724E-1DD8-4A67-BB12-444B089A282C}" type="datetimeFigureOut">
               <a:rPr lang="en-GB" smtClean="0"/>
-              <a:t>26/12/2023</a:t>
+              <a:t>10/01/2024</a:t>
             </a:fld>
             <a:endParaRPr lang="en-GB"/>
           </a:p>
@@ -2925,7 +2930,7 @@
           <a:p>
             <a:fld id="{271A724E-1DD8-4A67-BB12-444B089A282C}" type="datetimeFigureOut">
               <a:rPr lang="en-GB" smtClean="0"/>
-              <a:t>26/12/2023</a:t>
+              <a:t>10/01/2024</a:t>
             </a:fld>
             <a:endParaRPr lang="en-GB"/>
           </a:p>
@@ -4184,8 +4189,8 @@
         </p:nvSpPr>
         <p:spPr>
           <a:xfrm>
-            <a:off x="2999810" y="987549"/>
-            <a:ext cx="7457491" cy="1600438"/>
+            <a:off x="3296707" y="775201"/>
+            <a:ext cx="6452407" cy="2708434"/>
           </a:xfrm>
           <a:prstGeom prst="rect">
             <a:avLst/>
@@ -4199,120 +4204,163 @@
           <a:lstStyle/>
           <a:p>
             <a:r>
-              <a:rPr lang="en-US" altLang="zh-CN" sz="1400" dirty="0"/>
+              <a:rPr lang="zh-CN" altLang="en-US" sz="1200" dirty="0"/>
+              <a:t>左旋转思路，向左旋转。</a:t>
+            </a:r>
+            <a:endParaRPr lang="en-US" altLang="zh-CN" sz="1200" dirty="0"/>
+          </a:p>
+          <a:p>
+            <a:endParaRPr lang="en-US" altLang="zh-CN" sz="1200" dirty="0"/>
+          </a:p>
+          <a:p>
+            <a:r>
+              <a:rPr lang="en-US" altLang="zh-CN" sz="1200" dirty="0"/>
               <a:t>1, </a:t>
             </a:r>
             <a:r>
+              <a:rPr lang="zh-CN" altLang="en-US" sz="1200" dirty="0"/>
+              <a:t>首先新建一个临时节点</a:t>
+            </a:r>
+            <a:r>
+              <a:rPr lang="en-GB" altLang="zh-CN" sz="1200" dirty="0" err="1"/>
+              <a:t>newNode</a:t>
+            </a:r>
+            <a:r>
+              <a:rPr lang="zh-CN" altLang="en-US" sz="1200" dirty="0"/>
+              <a:t>，存储根节点的值；</a:t>
+            </a:r>
+            <a:endParaRPr lang="en-GB" altLang="zh-CN" sz="1200" dirty="0"/>
+          </a:p>
+          <a:p>
+            <a:endParaRPr lang="en-GB" altLang="zh-CN" sz="1200" dirty="0"/>
+          </a:p>
+          <a:p>
+            <a:r>
+              <a:rPr lang="en-GB" altLang="zh-CN" sz="1200" dirty="0"/>
+              <a:t>2,</a:t>
+            </a:r>
+            <a:r>
+              <a:rPr lang="zh-CN" altLang="en-US" sz="1200" dirty="0"/>
+              <a:t> 然后把这个新节点左边指向原根节点的左节点，右边指向根节点</a:t>
+            </a:r>
+            <a:r>
+              <a:rPr lang="en-GB" altLang="zh-CN" sz="1200" dirty="0"/>
+              <a:t>2</a:t>
+            </a:r>
+            <a:r>
+              <a:rPr lang="zh-CN" altLang="en-US" sz="1200" dirty="0"/>
+              <a:t>的右节点</a:t>
+            </a:r>
+            <a:r>
+              <a:rPr lang="en-GB" altLang="zh-CN" sz="1200" dirty="0"/>
+              <a:t>(4)</a:t>
+            </a:r>
+            <a:r>
+              <a:rPr lang="zh-CN" altLang="en-US" sz="1200" dirty="0"/>
+              <a:t>的左节点</a:t>
+            </a:r>
+            <a:r>
+              <a:rPr lang="en-GB" altLang="zh-CN" sz="1200" dirty="0"/>
+              <a:t>(3)</a:t>
+            </a:r>
+            <a:r>
+              <a:rPr lang="zh-CN" altLang="en-US" sz="1200" dirty="0"/>
+              <a:t>。</a:t>
+            </a:r>
+            <a:endParaRPr lang="en-GB" altLang="zh-CN" sz="1200" dirty="0"/>
+          </a:p>
+          <a:p>
+            <a:r>
+              <a:rPr lang="en-GB" altLang="zh-CN" sz="1200" dirty="0"/>
+              <a:t>    </a:t>
+            </a:r>
+            <a:r>
+              <a:rPr lang="zh-CN" altLang="en-US" sz="1200" dirty="0"/>
+              <a:t>原因，因为左子树上的值都比父节点大，所以新节点右边指向</a:t>
+            </a:r>
+            <a:r>
+              <a:rPr lang="en-GB" altLang="zh-CN" sz="1200" dirty="0"/>
+              <a:t>3</a:t>
+            </a:r>
+            <a:r>
+              <a:rPr lang="zh-CN" altLang="en-US" sz="1200" dirty="0"/>
+              <a:t>；</a:t>
+            </a:r>
+            <a:endParaRPr lang="en-GB" altLang="zh-CN" sz="1200" dirty="0"/>
+          </a:p>
+          <a:p>
+            <a:endParaRPr lang="en-GB" altLang="zh-CN" sz="1200" dirty="0"/>
+          </a:p>
+          <a:p>
+            <a:r>
+              <a:rPr lang="en-GB" altLang="zh-CN" sz="1200" dirty="0"/>
+              <a:t>3,</a:t>
+            </a:r>
+            <a:r>
+              <a:rPr lang="zh-CN" altLang="en-US" sz="1200" dirty="0"/>
+              <a:t> 把</a:t>
+            </a:r>
+            <a:r>
+              <a:rPr lang="en-GB" altLang="zh-CN" sz="1200" dirty="0"/>
+              <a:t>(4)</a:t>
+            </a:r>
+            <a:r>
+              <a:rPr lang="zh-CN" altLang="en-US" sz="1200" dirty="0"/>
+              <a:t>变为根节点，</a:t>
+            </a:r>
+            <a:r>
+              <a:rPr lang="en-GB" altLang="zh-CN" sz="1200" dirty="0"/>
+              <a:t>(4)</a:t>
+            </a:r>
+            <a:r>
+              <a:rPr lang="zh-CN" altLang="en-US" sz="1200" dirty="0"/>
+              <a:t>的左边指向临时节点；</a:t>
+            </a:r>
+            <a:endParaRPr lang="en-GB" altLang="zh-CN" sz="1200" dirty="0"/>
+          </a:p>
+          <a:p>
+            <a:r>
+              <a:rPr lang="zh-CN" altLang="en-US" sz="1200" dirty="0"/>
+              <a:t>以上步骤就完成了一次调整。因此需要在添加新节点时检查左右子树高度差是否</a:t>
+            </a:r>
+            <a:r>
+              <a:rPr lang="en-US" altLang="zh-CN" sz="1200" dirty="0"/>
+              <a:t>&gt;=2</a:t>
+            </a:r>
+            <a:r>
+              <a:rPr lang="zh-CN" altLang="en-US" sz="1200" dirty="0"/>
+              <a:t>，若成立</a:t>
+            </a:r>
+            <a:endParaRPr lang="en-GB" altLang="zh-CN" sz="1200" dirty="0"/>
+          </a:p>
+          <a:p>
+            <a:r>
+              <a:rPr lang="zh-CN" altLang="en-US" sz="1200" dirty="0"/>
+              <a:t>则需要添加一次节点就旋转一次。</a:t>
+            </a:r>
+            <a:endParaRPr lang="en-GB" altLang="zh-CN" sz="1200" dirty="0"/>
+          </a:p>
+          <a:p>
+            <a:endParaRPr lang="en-GB" altLang="zh-CN" sz="1200" dirty="0"/>
+          </a:p>
+          <a:p>
+            <a:r>
+              <a:rPr lang="zh-CN" altLang="en-US" sz="1200" dirty="0"/>
+              <a:t>右旋转思路同理</a:t>
+            </a:r>
+            <a:endParaRPr lang="en-GB" altLang="zh-CN" sz="1200" dirty="0"/>
+          </a:p>
+          <a:p>
+            <a:endParaRPr lang="en-GB" altLang="zh-CN" sz="1200" dirty="0"/>
+          </a:p>
+          <a:p>
+            <a:r>
+              <a:rPr lang="zh-CN" altLang="en-US" sz="1200" dirty="0"/>
+              <a:t>目前只考虑简单的情况，后续还有复杂的待进一步学习</a:t>
+            </a:r>
+            <a:r>
               <a:rPr lang="zh-CN" altLang="en-US" sz="1400" dirty="0"/>
-              <a:t>首先新建一个临时节点</a:t>
-            </a:r>
-            <a:r>
-              <a:rPr lang="en-GB" altLang="zh-CN" sz="1400" dirty="0" err="1"/>
-              <a:t>newNode</a:t>
-            </a:r>
-            <a:r>
-              <a:rPr lang="zh-CN" altLang="en-US" sz="1400" dirty="0"/>
-              <a:t>，存储根节点的值</a:t>
-            </a:r>
-            <a:endParaRPr lang="en-GB" altLang="zh-CN" sz="1400" dirty="0"/>
-          </a:p>
-          <a:p>
-            <a:r>
-              <a:rPr lang="en-GB" altLang="zh-CN" sz="1400" dirty="0"/>
-              <a:t>2,</a:t>
-            </a:r>
-            <a:r>
-              <a:rPr lang="zh-CN" altLang="en-US" sz="1400" dirty="0"/>
-              <a:t> 然后把这个节点指向原根节点的左节点，右边指向根节点</a:t>
-            </a:r>
-            <a:r>
-              <a:rPr lang="en-GB" altLang="zh-CN" sz="1400" dirty="0"/>
-              <a:t>2</a:t>
-            </a:r>
-            <a:r>
-              <a:rPr lang="zh-CN" altLang="en-US" sz="1400" dirty="0"/>
-              <a:t>的右节点</a:t>
-            </a:r>
-            <a:r>
-              <a:rPr lang="en-GB" altLang="zh-CN" sz="1400" dirty="0"/>
-              <a:t>(4)</a:t>
-            </a:r>
-            <a:r>
-              <a:rPr lang="zh-CN" altLang="en-US" sz="1400" dirty="0"/>
-              <a:t>的左节点</a:t>
-            </a:r>
-            <a:r>
-              <a:rPr lang="en-GB" altLang="zh-CN" sz="1400" dirty="0"/>
-              <a:t>(3)</a:t>
-            </a:r>
-          </a:p>
-          <a:p>
-            <a:r>
-              <a:rPr lang="en-GB" altLang="zh-CN" sz="1400" dirty="0"/>
-              <a:t>    </a:t>
-            </a:r>
-            <a:r>
-              <a:rPr lang="zh-CN" altLang="en-US" sz="1400" dirty="0"/>
-              <a:t>原因，因为左子树上的值都比父节点大，所以新节点右边指向</a:t>
-            </a:r>
-            <a:r>
-              <a:rPr lang="en-GB" altLang="zh-CN" sz="1400" dirty="0"/>
-              <a:t>3</a:t>
-            </a:r>
-          </a:p>
-          <a:p>
-            <a:r>
-              <a:rPr lang="en-GB" altLang="zh-CN" sz="1400" dirty="0"/>
-              <a:t>3,</a:t>
-            </a:r>
-            <a:r>
-              <a:rPr lang="zh-CN" altLang="en-US" sz="1400" dirty="0"/>
-              <a:t> 把</a:t>
-            </a:r>
-            <a:r>
-              <a:rPr lang="en-GB" altLang="zh-CN" sz="1400" dirty="0"/>
-              <a:t>(4)</a:t>
-            </a:r>
-            <a:r>
-              <a:rPr lang="zh-CN" altLang="en-US" sz="1400" dirty="0"/>
-              <a:t>变为根节点，</a:t>
-            </a:r>
-            <a:r>
-              <a:rPr lang="en-GB" altLang="zh-CN" sz="1400" dirty="0"/>
-              <a:t>(4)</a:t>
-            </a:r>
-            <a:r>
-              <a:rPr lang="zh-CN" altLang="en-US" sz="1400" dirty="0"/>
-              <a:t>的左边指向临时节点</a:t>
-            </a:r>
-            <a:endParaRPr lang="en-GB" altLang="zh-CN" sz="1400" dirty="0"/>
-          </a:p>
-          <a:p>
-            <a:r>
-              <a:rPr lang="zh-CN" altLang="en-US" sz="1400" dirty="0"/>
-              <a:t>以上步骤就完成了一次调整。因此需要在添加新节点时检查左右子树高度差是否</a:t>
-            </a:r>
-            <a:r>
-              <a:rPr lang="en-US" altLang="zh-CN" sz="1400" dirty="0"/>
-              <a:t>&gt;=2</a:t>
-            </a:r>
-            <a:r>
-              <a:rPr lang="zh-CN" altLang="en-US" sz="1400" dirty="0"/>
-              <a:t>，若成立</a:t>
-            </a:r>
-            <a:endParaRPr lang="en-GB" altLang="zh-CN" sz="1400" dirty="0"/>
-          </a:p>
-          <a:p>
-            <a:r>
-              <a:rPr lang="zh-CN" altLang="en-US" sz="1400" dirty="0"/>
-              <a:t>则需要添加一次节点就旋转一次。</a:t>
-            </a:r>
-            <a:endParaRPr lang="en-GB" altLang="zh-CN" sz="1400" dirty="0"/>
-          </a:p>
-          <a:p>
-            <a:r>
-              <a:rPr lang="zh-CN" altLang="en-US" sz="1400" dirty="0"/>
-              <a:t>目前只考虑简单的情况，后续还有复杂的待进一步学习。</a:t>
+              <a:t>。</a:t>
             </a:r>
             <a:r>
               <a:rPr lang="en-US" altLang="zh-CN" sz="1400" dirty="0"/>

</xml_diff>